<commit_message>
Updated IP address URL
</commit_message>
<xml_diff>
--- a/Pen-testing Cloud REST APIs - BSidesSATX2023.pptx
+++ b/Pen-testing Cloud REST APIs - BSidesSATX2023.pptx
@@ -293,7 +293,7 @@
   </p:defaultTextStyle>
   <p:extLst>
     <p:ext uri="{EFAFB233-063F-42B5-8137-9DF3F51BA10A}">
-      <p15:sldGuideLst xmlns:p15="http://schemas.microsoft.com/office/powerpoint/2012/main">
+      <p15:sldGuideLst xmlns:p15="http://schemas.microsoft.com/office/powerpoint/2012/main" xmlns="">
         <p15:guide id="1" orient="horz" pos="1620">
           <p15:clr>
             <a:srgbClr val="A4A3A4"/>
@@ -6018,6 +6018,15 @@
             </a:pPr>
             <a:fld id="{00000000-1234-1234-1234-123412341234}" type="slidenum">
               <a:rPr lang="en"/>
+              <a:pPr marL="0" lvl="0" indent="0" algn="r" rtl="0">
+                <a:spcBef>
+                  <a:spcPts val="0"/>
+                </a:spcBef>
+                <a:spcAft>
+                  <a:spcPts val="0"/>
+                </a:spcAft>
+                <a:buNone/>
+              </a:pPr>
               <a:t>‹#›</a:t>
             </a:fld>
             <a:endParaRPr/>
@@ -6382,6 +6391,15 @@
             </a:pPr>
             <a:fld id="{00000000-1234-1234-1234-123412341234}" type="slidenum">
               <a:rPr lang="en"/>
+              <a:pPr marL="0" lvl="0" indent="0" algn="r" rtl="0">
+                <a:spcBef>
+                  <a:spcPts val="0"/>
+                </a:spcBef>
+                <a:spcAft>
+                  <a:spcPts val="0"/>
+                </a:spcAft>
+                <a:buNone/>
+              </a:pPr>
               <a:t>‹#›</a:t>
             </a:fld>
             <a:endParaRPr/>
@@ -6486,6 +6504,15 @@
             </a:pPr>
             <a:fld id="{00000000-1234-1234-1234-123412341234}" type="slidenum">
               <a:rPr lang="en"/>
+              <a:pPr marL="0" lvl="0" indent="0" algn="r" rtl="0">
+                <a:spcBef>
+                  <a:spcPts val="0"/>
+                </a:spcBef>
+                <a:spcAft>
+                  <a:spcPts val="0"/>
+                </a:spcAft>
+                <a:buNone/>
+              </a:pPr>
               <a:t>‹#›</a:t>
             </a:fld>
             <a:endParaRPr/>
@@ -6719,6 +6746,15 @@
             </a:pPr>
             <a:fld id="{00000000-1234-1234-1234-123412341234}" type="slidenum">
               <a:rPr lang="en"/>
+              <a:pPr marL="0" lvl="0" indent="0" algn="r" rtl="0">
+                <a:spcBef>
+                  <a:spcPts val="0"/>
+                </a:spcBef>
+                <a:spcAft>
+                  <a:spcPts val="0"/>
+                </a:spcAft>
+                <a:buNone/>
+              </a:pPr>
               <a:t>‹#›</a:t>
             </a:fld>
             <a:endParaRPr/>
@@ -7081,6 +7117,15 @@
             </a:pPr>
             <a:fld id="{00000000-1234-1234-1234-123412341234}" type="slidenum">
               <a:rPr lang="en"/>
+              <a:pPr marL="0" lvl="0" indent="0" algn="r" rtl="0">
+                <a:spcBef>
+                  <a:spcPts val="0"/>
+                </a:spcBef>
+                <a:spcAft>
+                  <a:spcPts val="0"/>
+                </a:spcAft>
+                <a:buNone/>
+              </a:pPr>
               <a:t>‹#›</a:t>
             </a:fld>
             <a:endParaRPr/>
@@ -7572,6 +7617,15 @@
             </a:pPr>
             <a:fld id="{00000000-1234-1234-1234-123412341234}" type="slidenum">
               <a:rPr lang="en"/>
+              <a:pPr marL="0" lvl="0" indent="0" algn="r" rtl="0">
+                <a:spcBef>
+                  <a:spcPts val="0"/>
+                </a:spcBef>
+                <a:spcAft>
+                  <a:spcPts val="0"/>
+                </a:spcAft>
+                <a:buNone/>
+              </a:pPr>
               <a:t>‹#›</a:t>
             </a:fld>
             <a:endParaRPr/>
@@ -7805,6 +7859,15 @@
             </a:pPr>
             <a:fld id="{00000000-1234-1234-1234-123412341234}" type="slidenum">
               <a:rPr lang="en"/>
+              <a:pPr marL="0" lvl="0" indent="0" algn="r" rtl="0">
+                <a:spcBef>
+                  <a:spcPts val="0"/>
+                </a:spcBef>
+                <a:spcAft>
+                  <a:spcPts val="0"/>
+                </a:spcAft>
+                <a:buNone/>
+              </a:pPr>
               <a:t>‹#›</a:t>
             </a:fld>
             <a:endParaRPr/>
@@ -8167,6 +8230,15 @@
             </a:pPr>
             <a:fld id="{00000000-1234-1234-1234-123412341234}" type="slidenum">
               <a:rPr lang="en"/>
+              <a:pPr marL="0" lvl="0" indent="0" algn="r" rtl="0">
+                <a:spcBef>
+                  <a:spcPts val="0"/>
+                </a:spcBef>
+                <a:spcAft>
+                  <a:spcPts val="0"/>
+                </a:spcAft>
+                <a:buNone/>
+              </a:pPr>
               <a:t>‹#›</a:t>
             </a:fld>
             <a:endParaRPr/>
@@ -8400,6 +8472,15 @@
             </a:pPr>
             <a:fld id="{00000000-1234-1234-1234-123412341234}" type="slidenum">
               <a:rPr lang="en"/>
+              <a:pPr marL="0" lvl="0" indent="0" algn="r" rtl="0">
+                <a:spcBef>
+                  <a:spcPts val="0"/>
+                </a:spcBef>
+                <a:spcAft>
+                  <a:spcPts val="0"/>
+                </a:spcAft>
+                <a:buNone/>
+              </a:pPr>
               <a:t>‹#›</a:t>
             </a:fld>
             <a:endParaRPr/>
@@ -8958,6 +9039,15 @@
             </a:pPr>
             <a:fld id="{00000000-1234-1234-1234-123412341234}" type="slidenum">
               <a:rPr lang="en"/>
+              <a:pPr marL="0" lvl="0" indent="0" algn="r" rtl="0">
+                <a:spcBef>
+                  <a:spcPts val="0"/>
+                </a:spcBef>
+                <a:spcAft>
+                  <a:spcPts val="0"/>
+                </a:spcAft>
+                <a:buNone/>
+              </a:pPr>
               <a:t>‹#›</a:t>
             </a:fld>
             <a:endParaRPr/>
@@ -9106,6 +9196,15 @@
             </a:pPr>
             <a:fld id="{00000000-1234-1234-1234-123412341234}" type="slidenum">
               <a:rPr lang="en"/>
+              <a:pPr marL="0" lvl="0" indent="0" algn="r" rtl="0">
+                <a:spcBef>
+                  <a:spcPts val="0"/>
+                </a:spcBef>
+                <a:spcAft>
+                  <a:spcPts val="0"/>
+                </a:spcAft>
+                <a:buNone/>
+              </a:pPr>
               <a:t>‹#›</a:t>
             </a:fld>
             <a:endParaRPr/>
@@ -9677,6 +9776,15 @@
             </a:pPr>
             <a:fld id="{00000000-1234-1234-1234-123412341234}" type="slidenum">
               <a:rPr lang="en"/>
+              <a:pPr marL="0" lvl="0" indent="0" algn="r" rtl="0">
+                <a:spcBef>
+                  <a:spcPts val="0"/>
+                </a:spcBef>
+                <a:spcAft>
+                  <a:spcPts val="0"/>
+                </a:spcAft>
+                <a:buNone/>
+              </a:pPr>
               <a:t>‹#›</a:t>
             </a:fld>
             <a:endParaRPr/>
@@ -10688,7 +10796,7 @@
         </p:spPr>
         <p:txBody>
           <a:bodyPr spcFirstLastPara="1" wrap="square" lIns="91425" tIns="91425" rIns="91425" bIns="91425" anchor="t" anchorCtr="0">
-            <a:normAutofit fontScale="92500"/>
+            <a:normAutofit fontScale="92500" lnSpcReduction="10000"/>
           </a:bodyPr>
           <a:lstStyle/>
           <a:p>
@@ -12609,7 +12717,7 @@
           <p:cNvPr id="5" name="Rectangle 4">
             <a:extLst>
               <a:ext uri="{FF2B5EF4-FFF2-40B4-BE49-F238E27FC236}">
-                <a16:creationId xmlns:a16="http://schemas.microsoft.com/office/drawing/2014/main" id="{80FFA54E-6A29-97CE-CBED-423BEFAFAEE5}"/>
+                <a16:creationId xmlns:a16="http://schemas.microsoft.com/office/drawing/2014/main" xmlns="" id="{80FFA54E-6A29-97CE-CBED-423BEFAFAEE5}"/>
               </a:ext>
             </a:extLst>
           </p:cNvPr>
@@ -12657,7 +12765,7 @@
           <p:cNvPr id="6" name="TextBox 5">
             <a:extLst>
               <a:ext uri="{FF2B5EF4-FFF2-40B4-BE49-F238E27FC236}">
-                <a16:creationId xmlns:a16="http://schemas.microsoft.com/office/drawing/2014/main" id="{35621C35-679D-F761-785A-A87CC8FEF831}"/>
+                <a16:creationId xmlns:a16="http://schemas.microsoft.com/office/drawing/2014/main" xmlns="" id="{35621C35-679D-F761-785A-A87CC8FEF831}"/>
               </a:ext>
             </a:extLst>
           </p:cNvPr>
@@ -12713,7 +12821,7 @@
     </p:spTree>
     <p:extLst>
       <p:ext uri="{BB962C8B-B14F-4D97-AF65-F5344CB8AC3E}">
-        <p14:creationId xmlns:p14="http://schemas.microsoft.com/office/powerpoint/2010/main" val="2791564330"/>
+        <p14:creationId xmlns:p14="http://schemas.microsoft.com/office/powerpoint/2010/main" xmlns="" val="2791564330"/>
       </p:ext>
     </p:extLst>
   </p:cSld>
@@ -12903,6 +13011,10 @@
                 <a:sym typeface="Courier New"/>
               </a:rPr>
               <a:t>ping $LAB_OPENSTACK_IP</a:t>
+            </a:r>
+            <a:r>
+              <a:rPr lang="en"/>
+              <a:t/>
             </a:r>
             <a:br>
               <a:rPr lang="en"/>
@@ -14537,13 +14649,13 @@
               <a:t>	</a:t>
             </a:r>
             <a:r>
-              <a:rPr lang="en" sz="3600" u="sng" dirty="0">
+              <a:rPr lang="en-US" sz="3600" u="sng" dirty="0" smtClean="0">
                 <a:solidFill>
                   <a:schemeClr val="hlink"/>
                 </a:solidFill>
                 <a:hlinkClick r:id="rId3"/>
               </a:rPr>
-              <a:t>http://198.51.100.199/</a:t>
+              <a:t>http://198.51.100.1/</a:t>
             </a:r>
             <a:endParaRPr sz="3600" dirty="0"/>
           </a:p>
@@ -14688,7 +14800,7 @@
           <p:cNvPr id="1026" name="Picture 2">
             <a:extLst>
               <a:ext uri="{FF2B5EF4-FFF2-40B4-BE49-F238E27FC236}">
-                <a16:creationId xmlns:a16="http://schemas.microsoft.com/office/drawing/2014/main" id="{85EB4E72-1F39-A408-0BCC-F9ED95EDA6E8}"/>
+                <a16:creationId xmlns:a16="http://schemas.microsoft.com/office/drawing/2014/main" xmlns="" id="{85EB4E72-1F39-A408-0BCC-F9ED95EDA6E8}"/>
               </a:ext>
             </a:extLst>
           </p:cNvPr>
@@ -14701,7 +14813,7 @@
           <a:blip r:embed="rId5">
             <a:extLst>
               <a:ext uri="{28A0092B-C50C-407E-A947-70E740481C1C}">
-                <a14:useLocalDpi xmlns:a14="http://schemas.microsoft.com/office/drawing/2010/main" val="0"/>
+                <a14:useLocalDpi xmlns:a14="http://schemas.microsoft.com/office/drawing/2010/main" xmlns="" val="0"/>
               </a:ext>
             </a:extLst>
           </a:blip>
@@ -14721,7 +14833,7 @@
           <a:noFill/>
           <a:extLst>
             <a:ext uri="{909E8E84-426E-40DD-AFC4-6F175D3DCCD1}">
-              <a14:hiddenFill xmlns:a14="http://schemas.microsoft.com/office/drawing/2010/main">
+              <a14:hiddenFill xmlns:a14="http://schemas.microsoft.com/office/drawing/2010/main" xmlns="">
                 <a:solidFill>
                   <a:srgbClr val="FFFFFF"/>
                 </a:solidFill>
@@ -15940,7 +16052,7 @@
           <p:cNvPr id="2" name="Title 1">
             <a:extLst>
               <a:ext uri="{FF2B5EF4-FFF2-40B4-BE49-F238E27FC236}">
-                <a16:creationId xmlns:a16="http://schemas.microsoft.com/office/drawing/2014/main" id="{4D05A771-2651-45C4-FA0F-0C7733D0B764}"/>
+                <a16:creationId xmlns:a16="http://schemas.microsoft.com/office/drawing/2014/main" xmlns="" id="{4D05A771-2651-45C4-FA0F-0C7733D0B764}"/>
               </a:ext>
             </a:extLst>
           </p:cNvPr>
@@ -15970,7 +16082,7 @@
           <p:cNvPr id="3" name="Text Placeholder 2">
             <a:extLst>
               <a:ext uri="{FF2B5EF4-FFF2-40B4-BE49-F238E27FC236}">
-                <a16:creationId xmlns:a16="http://schemas.microsoft.com/office/drawing/2014/main" id="{CE2790B7-B350-755B-21BD-23DC94391D4E}"/>
+                <a16:creationId xmlns:a16="http://schemas.microsoft.com/office/drawing/2014/main" xmlns="" id="{CE2790B7-B350-755B-21BD-23DC94391D4E}"/>
               </a:ext>
             </a:extLst>
           </p:cNvPr>
@@ -15993,7 +16105,7 @@
     </p:spTree>
     <p:extLst>
       <p:ext uri="{BB962C8B-B14F-4D97-AF65-F5344CB8AC3E}">
-        <p14:creationId xmlns:p14="http://schemas.microsoft.com/office/powerpoint/2010/main" val="4255138776"/>
+        <p14:creationId xmlns:p14="http://schemas.microsoft.com/office/powerpoint/2010/main" xmlns="" val="4255138776"/>
       </p:ext>
     </p:extLst>
   </p:cSld>
@@ -18278,13 +18390,13 @@
               <a:buChar char="○"/>
             </a:pPr>
             <a:r>
-              <a:rPr lang="en" u="sng" dirty="0">
+              <a:rPr lang="en-US" u="sng" dirty="0" smtClean="0">
                 <a:solidFill>
                   <a:schemeClr val="hlink"/>
                 </a:solidFill>
                 <a:hlinkClick r:id="rId3"/>
               </a:rPr>
-              <a:t>http://198.51.100.199/</a:t>
+              <a:t>http://198.51.100.1/</a:t>
             </a:r>
             <a:endParaRPr dirty="0"/>
           </a:p>
@@ -18863,7 +18975,7 @@
           <p:cNvPr id="2" name="Title 1">
             <a:extLst>
               <a:ext uri="{FF2B5EF4-FFF2-40B4-BE49-F238E27FC236}">
-                <a16:creationId xmlns:a16="http://schemas.microsoft.com/office/drawing/2014/main" id="{CFA531E2-984C-43E1-9DF7-8CF31F21A982}"/>
+                <a16:creationId xmlns:a16="http://schemas.microsoft.com/office/drawing/2014/main" xmlns="" id="{CFA531E2-984C-43E1-9DF7-8CF31F21A982}"/>
               </a:ext>
             </a:extLst>
           </p:cNvPr>
@@ -18893,7 +19005,7 @@
           <p:cNvPr id="2050" name="Picture 2" descr="Gear">
             <a:extLst>
               <a:ext uri="{FF2B5EF4-FFF2-40B4-BE49-F238E27FC236}">
-                <a16:creationId xmlns:a16="http://schemas.microsoft.com/office/drawing/2014/main" id="{14EB8B01-AE5A-B9C2-A289-A8FE7944A53F}"/>
+                <a16:creationId xmlns:a16="http://schemas.microsoft.com/office/drawing/2014/main" xmlns="" id="{14EB8B01-AE5A-B9C2-A289-A8FE7944A53F}"/>
               </a:ext>
             </a:extLst>
           </p:cNvPr>
@@ -18906,7 +19018,7 @@
           <a:blip r:embed="rId2">
             <a:extLst>
               <a:ext uri="{28A0092B-C50C-407E-A947-70E740481C1C}">
-                <a14:useLocalDpi xmlns:a14="http://schemas.microsoft.com/office/drawing/2010/main" val="0"/>
+                <a14:useLocalDpi xmlns:a14="http://schemas.microsoft.com/office/drawing/2010/main" xmlns="" val="0"/>
               </a:ext>
             </a:extLst>
           </a:blip>
@@ -18926,7 +19038,7 @@
           <a:noFill/>
           <a:extLst>
             <a:ext uri="{909E8E84-426E-40DD-AFC4-6F175D3DCCD1}">
-              <a14:hiddenFill xmlns:a14="http://schemas.microsoft.com/office/drawing/2010/main">
+              <a14:hiddenFill xmlns:a14="http://schemas.microsoft.com/office/drawing/2010/main" xmlns="">
                 <a:solidFill>
                   <a:srgbClr val="FFFFFF"/>
                 </a:solidFill>
@@ -18938,7 +19050,7 @@
     </p:spTree>
     <p:extLst>
       <p:ext uri="{BB962C8B-B14F-4D97-AF65-F5344CB8AC3E}">
-        <p14:creationId xmlns:p14="http://schemas.microsoft.com/office/powerpoint/2010/main" val="3163197818"/>
+        <p14:creationId xmlns:p14="http://schemas.microsoft.com/office/powerpoint/2010/main" xmlns="" val="3163197818"/>
       </p:ext>
     </p:extLst>
   </p:cSld>
@@ -20748,7 +20860,7 @@
           <p:cNvPr id="2" name="Title 1">
             <a:extLst>
               <a:ext uri="{FF2B5EF4-FFF2-40B4-BE49-F238E27FC236}">
-                <a16:creationId xmlns:a16="http://schemas.microsoft.com/office/drawing/2014/main" id="{EE8EC645-BA7A-4FB6-6365-5C108ED88912}"/>
+                <a16:creationId xmlns:a16="http://schemas.microsoft.com/office/drawing/2014/main" xmlns="" id="{EE8EC645-BA7A-4FB6-6365-5C108ED88912}"/>
               </a:ext>
             </a:extLst>
           </p:cNvPr>
@@ -20778,7 +20890,7 @@
           <p:cNvPr id="3" name="Text Placeholder 2">
             <a:extLst>
               <a:ext uri="{FF2B5EF4-FFF2-40B4-BE49-F238E27FC236}">
-                <a16:creationId xmlns:a16="http://schemas.microsoft.com/office/drawing/2014/main" id="{2D30A1D3-377F-2D41-DB10-5C13CDDB0190}"/>
+                <a16:creationId xmlns:a16="http://schemas.microsoft.com/office/drawing/2014/main" xmlns="" id="{2D30A1D3-377F-2D41-DB10-5C13CDDB0190}"/>
               </a:ext>
             </a:extLst>
           </p:cNvPr>
@@ -20804,7 +20916,7 @@
     </p:spTree>
     <p:extLst>
       <p:ext uri="{BB962C8B-B14F-4D97-AF65-F5344CB8AC3E}">
-        <p14:creationId xmlns:p14="http://schemas.microsoft.com/office/powerpoint/2010/main" val="701766970"/>
+        <p14:creationId xmlns:p14="http://schemas.microsoft.com/office/powerpoint/2010/main" xmlns="" val="701766970"/>
       </p:ext>
     </p:extLst>
   </p:cSld>
@@ -21091,7 +21203,7 @@
           <p:cNvPr id="3074" name="Picture 2" descr="Filmstrip Glyph DIngbat">
             <a:extLst>
               <a:ext uri="{FF2B5EF4-FFF2-40B4-BE49-F238E27FC236}">
-                <a16:creationId xmlns:a16="http://schemas.microsoft.com/office/drawing/2014/main" id="{66F4F503-2FC6-D48C-1034-E50F7620AFF5}"/>
+                <a16:creationId xmlns:a16="http://schemas.microsoft.com/office/drawing/2014/main" xmlns="" id="{66F4F503-2FC6-D48C-1034-E50F7620AFF5}"/>
               </a:ext>
             </a:extLst>
           </p:cNvPr>
@@ -21104,7 +21216,7 @@
           <a:blip r:embed="rId3">
             <a:extLst>
               <a:ext uri="{28A0092B-C50C-407E-A947-70E740481C1C}">
-                <a14:useLocalDpi xmlns:a14="http://schemas.microsoft.com/office/drawing/2010/main" val="0"/>
+                <a14:useLocalDpi xmlns:a14="http://schemas.microsoft.com/office/drawing/2010/main" xmlns="" val="0"/>
               </a:ext>
             </a:extLst>
           </a:blip>
@@ -21124,7 +21236,7 @@
           <a:noFill/>
           <a:extLst>
             <a:ext uri="{909E8E84-426E-40DD-AFC4-6F175D3DCCD1}">
-              <a14:hiddenFill xmlns:a14="http://schemas.microsoft.com/office/drawing/2010/main">
+              <a14:hiddenFill xmlns:a14="http://schemas.microsoft.com/office/drawing/2010/main" xmlns="">
                 <a:solidFill>
                   <a:srgbClr val="FFFFFF"/>
                 </a:solidFill>
@@ -21801,12 +21913,24 @@
             <a:br>
               <a:rPr lang="en"/>
             </a:br>
+            <a:r>
+              <a:rPr lang="en"/>
+              <a:t/>
+            </a:r>
             <a:br>
               <a:rPr lang="en"/>
             </a:br>
+            <a:r>
+              <a:rPr lang="en"/>
+              <a:t/>
+            </a:r>
             <a:br>
               <a:rPr lang="en"/>
             </a:br>
+            <a:r>
+              <a:rPr lang="en"/>
+              <a:t/>
+            </a:r>
             <a:br>
               <a:rPr lang="en"/>
             </a:br>

</xml_diff>

<commit_message>
PDF versions, few typos fixed
</commit_message>
<xml_diff>
--- a/Pen-testing Cloud REST APIs - BSidesSATX2023.pptx
+++ b/Pen-testing Cloud REST APIs - BSidesSATX2023.pptx
@@ -8461,7 +8461,7 @@
         </p:spPr>
         <p:txBody>
           <a:bodyPr tIns="91440" bIns="91440" anchor="t">
-            <a:normAutofit fontScale="28000" lnSpcReduction="10000"/>
+            <a:normAutofit fontScale="28000" lnSpcReduction="20000"/>
           </a:bodyPr>
           <a:lstStyle/>
           <a:p>
@@ -11952,7 +11952,7 @@
         </p:spPr>
         <p:txBody>
           <a:bodyPr tIns="91440" bIns="91440" anchor="t">
-            <a:normAutofit fontScale="81000" lnSpcReduction="10000"/>
+            <a:normAutofit fontScale="88500" lnSpcReduction="20000"/>
           </a:bodyPr>
           <a:lstStyle/>
           <a:p>
@@ -16898,7 +16898,7 @@
         </p:spPr>
         <p:txBody>
           <a:bodyPr tIns="91440" bIns="91440" anchor="t">
-            <a:normAutofit fontScale="52000" lnSpcReduction="10000"/>
+            <a:normAutofit fontScale="59500" lnSpcReduction="20000"/>
           </a:bodyPr>
           <a:lstStyle/>
           <a:p>
@@ -16912,7 +16912,7 @@
               </a:tabLst>
             </a:pPr>
             <a:r>
-              <a:rPr lang="en" sz="1800" b="0" strike="noStrike" spc="-1">
+              <a:rPr lang="en" sz="1800" b="0" strike="noStrike" spc="-1" dirty="0">
                 <a:solidFill>
                   <a:schemeClr val="dk2"/>
                 </a:solidFill>
@@ -16921,7 +16921,7 @@
               </a:rPr>
               <a:t>Make a legit call</a:t>
             </a:r>
-            <a:endParaRPr lang="en-US" sz="1800" b="0" strike="noStrike" spc="-1">
+            <a:endParaRPr lang="en-US" sz="1800" b="0" strike="noStrike" spc="-1" dirty="0">
               <a:solidFill>
                 <a:srgbClr val="000000"/>
               </a:solidFill>
@@ -16942,7 +16942,7 @@
               </a:tabLst>
             </a:pPr>
             <a:r>
-              <a:rPr lang="en" sz="4350" b="0" strike="noStrike" spc="-1">
+              <a:rPr lang="en" sz="4000" b="0" strike="noStrike" spc="-1" dirty="0">
                 <a:solidFill>
                   <a:schemeClr val="dk2"/>
                 </a:solidFill>
@@ -16952,14 +16952,14 @@
               <a:t>swift –insecure</a:t>
             </a:r>
             <a:r>
-              <a:rPr sz="4350"/>
+              <a:rPr sz="4000" dirty="0"/>
               <a:t/>
             </a:r>
             <a:br>
-              <a:rPr sz="4350"/>
+              <a:rPr sz="4000" dirty="0"/>
             </a:br>
             <a:r>
-              <a:rPr lang="en" sz="4350" b="0" strike="noStrike" spc="-1">
+              <a:rPr lang="en" sz="4000" b="0" strike="noStrike" spc="-1" dirty="0">
                 <a:solidFill>
                   <a:schemeClr val="dk2"/>
                 </a:solidFill>
@@ -16968,7 +16968,7 @@
               </a:rPr>
               <a:t>-A https://${LAB_OPENSTACK_IP}:8080/auth/v1.0 -U account1:normal -K expected list</a:t>
             </a:r>
-            <a:endParaRPr lang="en-US" sz="4350" b="0" strike="noStrike" spc="-1">
+            <a:endParaRPr lang="en-US" sz="4000" b="0" strike="noStrike" spc="-1" dirty="0">
               <a:solidFill>
                 <a:srgbClr val="000000"/>
               </a:solidFill>
@@ -16988,7 +16988,7 @@
                 <a:tab pos="0" algn="l"/>
               </a:tabLst>
             </a:pPr>
-            <a:endParaRPr lang="en-US" sz="4350" b="0" strike="noStrike" spc="-1">
+            <a:endParaRPr lang="en-US" sz="4000" b="0" strike="noStrike" spc="-1" dirty="0">
               <a:solidFill>
                 <a:srgbClr val="000000"/>
               </a:solidFill>
@@ -17012,7 +17012,7 @@
               </a:tabLst>
             </a:pPr>
             <a:r>
-              <a:rPr lang="en" sz="4350" b="0" strike="noStrike" spc="-1">
+              <a:rPr lang="en" sz="4000" b="0" strike="noStrike" spc="-1" dirty="0">
                 <a:solidFill>
                   <a:schemeClr val="dk2"/>
                 </a:solidFill>
@@ -17022,14 +17022,14 @@
               <a:t>swift –insecure</a:t>
             </a:r>
             <a:r>
-              <a:rPr sz="4350"/>
+              <a:rPr sz="4000" dirty="0"/>
               <a:t/>
             </a:r>
             <a:br>
-              <a:rPr sz="4350"/>
+              <a:rPr sz="4000" dirty="0"/>
             </a:br>
             <a:r>
-              <a:rPr lang="en" sz="4350" b="0" strike="noStrike" spc="-1">
+              <a:rPr lang="en" sz="4000" b="0" strike="noStrike" spc="-1" dirty="0">
                 <a:solidFill>
                   <a:schemeClr val="dk2"/>
                 </a:solidFill>
@@ -17039,7 +17039,7 @@
               <a:t>-A https://${LAB_OPENSTACK_IP}:8080/auth/v1.0 -U </a:t>
             </a:r>
             <a:r>
-              <a:rPr lang="en" sz="4350" b="1" strike="noStrike" spc="-1">
+              <a:rPr lang="en" sz="4000" b="1" strike="noStrike" spc="-1" dirty="0">
                 <a:solidFill>
                   <a:schemeClr val="dk2"/>
                 </a:solidFill>
@@ -17049,7 +17049,7 @@
               <a:t>account1</a:t>
             </a:r>
             <a:r>
-              <a:rPr lang="en" sz="4350" b="0" strike="noStrike" spc="-1">
+              <a:rPr lang="en" sz="4000" b="0" strike="noStrike" spc="-1" dirty="0">
                 <a:solidFill>
                   <a:schemeClr val="dk2"/>
                 </a:solidFill>
@@ -17059,7 +17059,7 @@
               <a:t>:normal -K expected list </a:t>
             </a:r>
             <a:r>
-              <a:rPr lang="en" sz="4350" b="1" strike="noStrike" spc="-1">
+              <a:rPr lang="en" sz="4000" b="1" strike="noStrike" spc="-1" dirty="0">
                 <a:solidFill>
                   <a:schemeClr val="dk2"/>
                 </a:solidFill>
@@ -17068,7 +17068,7 @@
               </a:rPr>
               <a:t>deptdocs</a:t>
             </a:r>
-            <a:endParaRPr lang="en-US" sz="4350" b="0" strike="noStrike" spc="-1">
+            <a:endParaRPr lang="en-US" sz="4000" b="0" strike="noStrike" spc="-1" dirty="0">
               <a:solidFill>
                 <a:srgbClr val="000000"/>
               </a:solidFill>
@@ -17192,7 +17192,7 @@
         </p:spPr>
         <p:txBody>
           <a:bodyPr tIns="91440" bIns="91440" anchor="t">
-            <a:normAutofit fontScale="99000"/>
+            <a:normAutofit fontScale="99000" lnSpcReduction="10000"/>
           </a:bodyPr>
           <a:lstStyle/>
           <a:p>
@@ -19664,7 +19664,7 @@
         </p:spPr>
         <p:txBody>
           <a:bodyPr tIns="91440" bIns="91440" anchor="t">
-            <a:normAutofit fontScale="87000"/>
+            <a:normAutofit fontScale="94500" lnSpcReduction="10000"/>
           </a:bodyPr>
           <a:lstStyle/>
           <a:p>
@@ -19679,7 +19679,7 @@
               <a:buChar char="●"/>
             </a:pPr>
             <a:r>
-              <a:rPr lang="en" sz="1800" b="0" strike="noStrike" spc="-1">
+              <a:rPr lang="en" sz="1800" b="0" strike="noStrike" spc="-1" dirty="0">
                 <a:solidFill>
                   <a:schemeClr val="dk2"/>
                 </a:solidFill>
@@ -19688,7 +19688,7 @@
               </a:rPr>
               <a:t>One customer account</a:t>
             </a:r>
-            <a:endParaRPr lang="en-US" sz="1800" b="0" strike="noStrike" spc="-1">
+            <a:endParaRPr lang="en-US" sz="1800" b="0" strike="noStrike" spc="-1" dirty="0">
               <a:solidFill>
                 <a:srgbClr val="000000"/>
               </a:solidFill>
@@ -19707,7 +19707,7 @@
               <a:buChar char="○"/>
             </a:pPr>
             <a:r>
-              <a:rPr lang="en" sz="1400" b="0" strike="noStrike" spc="-1">
+              <a:rPr lang="en" sz="1400" b="0" strike="noStrike" spc="-1" dirty="0">
                 <a:solidFill>
                   <a:schemeClr val="dk2"/>
                 </a:solidFill>
@@ -19716,7 +19716,7 @@
               </a:rPr>
               <a:t>User A</a:t>
             </a:r>
-            <a:endParaRPr lang="en-US" sz="1400" b="0" strike="noStrike" spc="-1">
+            <a:endParaRPr lang="en-US" sz="1400" b="0" strike="noStrike" spc="-1" dirty="0">
               <a:solidFill>
                 <a:srgbClr val="000000"/>
               </a:solidFill>
@@ -19742,7 +19742,17 @@
                 <a:latin typeface="Arial"/>
                 <a:ea typeface="Arial"/>
               </a:rPr>
-              <a:t>User T</a:t>
+              <a:t>User </a:t>
+            </a:r>
+            <a:r>
+              <a:rPr lang="en" sz="1400" b="0" strike="noStrike" spc="-1" smtClean="0">
+                <a:solidFill>
+                  <a:schemeClr val="dk2"/>
+                </a:solidFill>
+                <a:latin typeface="Arial"/>
+                <a:ea typeface="Arial"/>
+              </a:rPr>
+              <a:t>B</a:t>
             </a:r>
             <a:endParaRPr lang="en-US" sz="1400" b="0" strike="noStrike" spc="-1">
               <a:solidFill>
@@ -19763,7 +19773,7 @@
               <a:buChar char="●"/>
             </a:pPr>
             <a:r>
-              <a:rPr lang="en" sz="1800" b="0" strike="noStrike" spc="-1">
+              <a:rPr lang="en" sz="1800" b="0" strike="noStrike" spc="-1" dirty="0">
                 <a:solidFill>
                   <a:schemeClr val="dk2"/>
                 </a:solidFill>
@@ -19772,7 +19782,7 @@
               </a:rPr>
               <a:t>User A has grants to only resources x,y,z</a:t>
             </a:r>
-            <a:endParaRPr lang="en-US" sz="1800" b="0" strike="noStrike" spc="-1">
+            <a:endParaRPr lang="en-US" sz="1800" b="0" strike="noStrike" spc="-1" dirty="0">
               <a:solidFill>
                 <a:srgbClr val="000000"/>
               </a:solidFill>
@@ -19791,7 +19801,7 @@
               <a:buChar char="●"/>
             </a:pPr>
             <a:r>
-              <a:rPr lang="en" sz="1800" b="0" strike="noStrike" spc="-1">
+              <a:rPr lang="en" sz="1800" b="0" strike="noStrike" spc="-1" dirty="0">
                 <a:solidFill>
                   <a:schemeClr val="dk2"/>
                 </a:solidFill>
@@ -19801,14 +19811,14 @@
               <a:t>User B has grants to only resources n,o,p</a:t>
             </a:r>
             <a:r>
-              <a:rPr sz="1800"/>
+              <a:rPr sz="1800" dirty="0"/>
               <a:t/>
             </a:r>
             <a:br>
-              <a:rPr sz="1800"/>
+              <a:rPr sz="1800" dirty="0"/>
             </a:br>
             <a:r>
-              <a:rPr lang="en" sz="1800" b="0" strike="noStrike" spc="-1">
+              <a:rPr lang="en" sz="1800" b="0" strike="noStrike" spc="-1" dirty="0">
                 <a:solidFill>
                   <a:schemeClr val="dk2"/>
                 </a:solidFill>
@@ -19816,7 +19826,7 @@
               </a:rPr>
               <a:t> </a:t>
             </a:r>
-            <a:endParaRPr lang="en-US" sz="1800" b="0" strike="noStrike" spc="-1">
+            <a:endParaRPr lang="en-US" sz="1800" b="0" strike="noStrike" spc="-1" dirty="0">
               <a:solidFill>
                 <a:srgbClr val="000000"/>
               </a:solidFill>
@@ -19835,7 +19845,7 @@
               <a:buChar char="●"/>
             </a:pPr>
             <a:r>
-              <a:rPr lang="en" sz="1800" b="0" strike="noStrike" spc="-1">
+              <a:rPr lang="en" sz="1800" b="0" strike="noStrike" spc="-1" dirty="0">
                 <a:solidFill>
                   <a:schemeClr val="dk2"/>
                 </a:solidFill>
@@ -19845,14 +19855,14 @@
               <a:t>An API must not allow B to access x,y,z</a:t>
             </a:r>
             <a:r>
-              <a:rPr sz="1800"/>
+              <a:rPr sz="1800" dirty="0"/>
               <a:t/>
             </a:r>
             <a:br>
-              <a:rPr sz="1800"/>
+              <a:rPr sz="1800" dirty="0"/>
             </a:br>
             <a:r>
-              <a:rPr lang="en" sz="1800" b="0" strike="noStrike" spc="-1">
+              <a:rPr lang="en" sz="1800" b="0" strike="noStrike" spc="-1" dirty="0">
                 <a:solidFill>
                   <a:schemeClr val="dk2"/>
                 </a:solidFill>
@@ -19860,7 +19870,7 @@
               </a:rPr>
               <a:t> </a:t>
             </a:r>
-            <a:endParaRPr lang="en-US" sz="1800" b="0" strike="noStrike" spc="-1">
+            <a:endParaRPr lang="en-US" sz="1800" b="0" strike="noStrike" spc="-1" dirty="0">
               <a:solidFill>
                 <a:srgbClr val="000000"/>
               </a:solidFill>
@@ -19879,7 +19889,7 @@
               <a:buChar char="●"/>
             </a:pPr>
             <a:r>
-              <a:rPr lang="en" sz="1800" b="0" strike="noStrike" spc="-1">
+              <a:rPr lang="en" sz="1800" b="0" strike="noStrike" spc="-1" dirty="0">
                 <a:solidFill>
                   <a:schemeClr val="dk2"/>
                 </a:solidFill>
@@ -19888,7 +19898,7 @@
               </a:rPr>
               <a:t>Hardest part?</a:t>
             </a:r>
-            <a:endParaRPr lang="en-US" sz="1800" b="0" strike="noStrike" spc="-1">
+            <a:endParaRPr lang="en-US" sz="1800" b="0" strike="noStrike" spc="-1" dirty="0">
               <a:solidFill>
                 <a:srgbClr val="000000"/>
               </a:solidFill>
@@ -19907,7 +19917,7 @@
               <a:buChar char="○"/>
             </a:pPr>
             <a:r>
-              <a:rPr lang="en" sz="1400" b="0" strike="noStrike" spc="-1">
+              <a:rPr lang="en" sz="1400" b="0" strike="noStrike" spc="-1" dirty="0">
                 <a:solidFill>
                   <a:schemeClr val="dk2"/>
                 </a:solidFill>
@@ -19916,7 +19926,7 @@
               </a:rPr>
               <a:t>What resources should an IAM policy protect?</a:t>
             </a:r>
-            <a:endParaRPr lang="en-US" sz="1400" b="0" strike="noStrike" spc="-1">
+            <a:endParaRPr lang="en-US" sz="1400" b="0" strike="noStrike" spc="-1" dirty="0">
               <a:solidFill>
                 <a:srgbClr val="000000"/>
               </a:solidFill>
@@ -19935,7 +19945,7 @@
               <a:buChar char="○"/>
             </a:pPr>
             <a:r>
-              <a:rPr lang="en" sz="1400" b="0" strike="noStrike" spc="-1">
+              <a:rPr lang="en" sz="1400" b="0" strike="noStrike" spc="-1" dirty="0">
                 <a:solidFill>
                   <a:schemeClr val="dk2"/>
                 </a:solidFill>
@@ -19944,7 +19954,7 @@
               </a:rPr>
               <a:t>Not all cloud APIs clearly document API access control features</a:t>
             </a:r>
-            <a:endParaRPr lang="en-US" sz="1400" b="0" strike="noStrike" spc="-1">
+            <a:endParaRPr lang="en-US" sz="1400" b="0" strike="noStrike" spc="-1" dirty="0">
               <a:solidFill>
                 <a:srgbClr val="000000"/>
               </a:solidFill>
@@ -19963,7 +19973,7 @@
               <a:buChar char="■"/>
             </a:pPr>
             <a:r>
-              <a:rPr lang="en" sz="1400" b="0" strike="noStrike" spc="-1">
+              <a:rPr lang="en" sz="1400" b="0" strike="noStrike" spc="-1" dirty="0">
                 <a:solidFill>
                   <a:schemeClr val="dk2"/>
                 </a:solidFill>
@@ -19972,7 +19982,7 @@
               </a:rPr>
               <a:t>Which makes customer mistakes more likely</a:t>
             </a:r>
-            <a:endParaRPr lang="en-US" sz="1400" b="0" strike="noStrike" spc="-1">
+            <a:endParaRPr lang="en-US" sz="1400" b="0" strike="noStrike" spc="-1" dirty="0">
               <a:solidFill>
                 <a:srgbClr val="000000"/>
               </a:solidFill>
@@ -19991,7 +20001,7 @@
               <a:buChar char="■"/>
             </a:pPr>
             <a:r>
-              <a:rPr lang="en" sz="1400" b="0" strike="noStrike" spc="-1">
+              <a:rPr lang="en" sz="1400" b="0" strike="noStrike" spc="-1" dirty="0">
                 <a:solidFill>
                   <a:schemeClr val="dk2"/>
                 </a:solidFill>
@@ -20000,7 +20010,7 @@
               </a:rPr>
               <a:t>Especially “Deny” rules in policies</a:t>
             </a:r>
-            <a:endParaRPr lang="en-US" sz="1400" b="0" strike="noStrike" spc="-1">
+            <a:endParaRPr lang="en-US" sz="1400" b="0" strike="noStrike" spc="-1" dirty="0">
               <a:solidFill>
                 <a:srgbClr val="000000"/>
               </a:solidFill>
@@ -21682,16 +21692,26 @@
               </a:tabLst>
             </a:pPr>
             <a:r>
-              <a:rPr lang="en" sz="2800" b="0" strike="noStrike" spc="-1">
+              <a:rPr lang="en" sz="2800" b="0" strike="noStrike" spc="-1" dirty="0">
                 <a:solidFill>
                   <a:schemeClr val="dk1"/>
                 </a:solidFill>
                 <a:latin typeface="Arial"/>
                 <a:ea typeface="Arial"/>
               </a:rPr>
-              <a:t>Proxy Cert Setup - 3</a:t>
-            </a:r>
-            <a:endParaRPr lang="en-US" sz="2800" b="0" strike="noStrike" spc="-1">
+              <a:t>Proxy Cert Setup - </a:t>
+            </a:r>
+            <a:r>
+              <a:rPr lang="en" sz="2800" b="0" strike="noStrike" spc="-1" dirty="0" smtClean="0">
+                <a:solidFill>
+                  <a:schemeClr val="dk1"/>
+                </a:solidFill>
+                <a:latin typeface="Arial"/>
+                <a:ea typeface="Arial"/>
+              </a:rPr>
+              <a:t>2</a:t>
+            </a:r>
+            <a:endParaRPr lang="en-US" sz="2800" b="0" strike="noStrike" spc="-1" dirty="0">
               <a:solidFill>
                 <a:srgbClr val="000000"/>
               </a:solidFill>

</xml_diff>